<commit_message>
work through some todos
</commit_message>
<xml_diff>
--- a/Vortrag.pptx
+++ b/Vortrag.pptx
@@ -650,13 +650,8 @@
             </a:r>
             <a:r>
               <a:rPr lang="de-DE" baseline="0" dirty="0" smtClean="0"/>
-              <a:t> einfügen „bspw. so</a:t>
-            </a:r>
-            <a:r>
-              <a:rPr lang="de-DE" baseline="0" dirty="0" smtClean="0"/>
-              <a:t>:“</a:t>
-            </a:r>
-            <a:endParaRPr lang="de-DE" baseline="0" dirty="0" smtClean="0"/>
+              <a:t> einfügen „bspw. so:“</a:t>
+            </a:r>
           </a:p>
           <a:p>
             <a:r>
@@ -884,11 +879,7 @@
             </a:r>
             <a:r>
               <a:rPr lang="de-DE" baseline="0" dirty="0" smtClean="0"/>
-              <a:t> </a:t>
-            </a:r>
-            <a:r>
-              <a:rPr lang="de-DE" baseline="0" dirty="0" smtClean="0"/>
-              <a:t>wird zum </a:t>
+              <a:t> wird zum </a:t>
             </a:r>
             <a:r>
               <a:rPr lang="de-DE" baseline="0" dirty="0" err="1" smtClean="0"/>
@@ -1120,7 +1111,11 @@
             </a:r>
             <a:r>
               <a:rPr lang="de-DE" i="1" baseline="0" dirty="0" smtClean="0"/>
-              <a:t> ersten Punkt umformulieren</a:t>
+              <a:t> ersten Punkt </a:t>
+            </a:r>
+            <a:r>
+              <a:rPr lang="de-DE" i="1" baseline="0" dirty="0" smtClean="0"/>
+              <a:t>umformulieren, Bild</a:t>
             </a:r>
             <a:endParaRPr lang="de-DE" i="1" dirty="0" smtClean="0"/>
           </a:p>
@@ -1283,19 +1278,11 @@
             </a:pPr>
             <a:r>
               <a:rPr lang="de-DE" baseline="0" dirty="0" smtClean="0"/>
-              <a:t>4.: </a:t>
-            </a:r>
-            <a:r>
-              <a:rPr lang="de-DE" baseline="0" dirty="0" smtClean="0"/>
-              <a:t>wissen nicht, wie schwierig </a:t>
-            </a:r>
-            <a:r>
-              <a:rPr lang="de-DE" dirty="0" smtClean="0"/>
-              <a:t>und </a:t>
-            </a:r>
-            <a:r>
-              <a:rPr lang="de-DE" dirty="0" smtClean="0"/>
-              <a:t>wollen auch nicht noch mehr mit „sorry“ annehmen</a:t>
+              <a:t>4.: wissen nicht, wie schwierig </a:t>
+            </a:r>
+            <a:r>
+              <a:rPr lang="de-DE" dirty="0" smtClean="0"/>
+              <a:t>und wollen auch nicht noch mehr mit „sorry“ annehmen</a:t>
             </a:r>
           </a:p>
           <a:p>
@@ -1389,15 +1376,7 @@
             </a:r>
             <a:r>
               <a:rPr lang="de-DE" baseline="0" dirty="0" smtClean="0"/>
-              <a:t> </a:t>
-            </a:r>
-            <a:r>
-              <a:rPr lang="de-DE" baseline="0" dirty="0" smtClean="0"/>
-              <a:t>hinzufügen</a:t>
-            </a:r>
-            <a:r>
-              <a:rPr lang="de-DE" baseline="0" dirty="0" smtClean="0"/>
-              <a:t>, </a:t>
+              <a:t> hinzufügen, </a:t>
             </a:r>
             <a:r>
               <a:rPr lang="de-DE" baseline="0" dirty="0" err="1" smtClean="0"/>
@@ -1405,11 +1384,7 @@
             </a:r>
             <a:r>
               <a:rPr lang="de-DE" baseline="0" dirty="0" smtClean="0"/>
-              <a:t> </a:t>
-            </a:r>
-            <a:r>
-              <a:rPr lang="de-DE" baseline="0" dirty="0" smtClean="0"/>
-              <a:t>vereinfachen</a:t>
+              <a:t> vereinfachen</a:t>
             </a:r>
             <a:endParaRPr lang="de-DE" dirty="0" smtClean="0"/>
           </a:p>
@@ -1448,11 +1423,7 @@
             </a:r>
             <a:r>
               <a:rPr lang="de-DE" baseline="0" dirty="0" smtClean="0"/>
-              <a:t> erhalten</a:t>
-            </a:r>
-            <a:r>
-              <a:rPr lang="de-DE" baseline="0" dirty="0" smtClean="0"/>
-              <a:t>. </a:t>
+              <a:t> erhalten. </a:t>
             </a:r>
             <a:r>
               <a:rPr lang="de-DE" baseline="0" dirty="0" smtClean="0">
@@ -1567,22 +1538,13 @@
             </a:r>
             <a:r>
               <a:rPr lang="de-DE" baseline="0" dirty="0" smtClean="0"/>
-              <a:t> Das war auch die Version, die in Isabelle2015 eingebaut </a:t>
-            </a:r>
+              <a:t> Das war auch die Version, die in Isabelle2015 eingebaut war</a:t>
+            </a:r>
+          </a:p>
+          <a:p>
             <a:r>
               <a:rPr lang="de-DE" baseline="0" dirty="0" smtClean="0"/>
-              <a:t>war</a:t>
-            </a:r>
-            <a:endParaRPr lang="de-DE" baseline="0" dirty="0" smtClean="0"/>
-          </a:p>
-          <a:p>
-            <a:r>
-              <a:rPr lang="de-DE" baseline="0" dirty="0" smtClean="0"/>
-              <a:t>3.: Oder wie in Java: Überhaupt keine </a:t>
-            </a:r>
-            <a:r>
-              <a:rPr lang="de-DE" baseline="0" dirty="0" smtClean="0"/>
-              <a:t>IEEE-Konformität</a:t>
+              <a:t>3.: Oder wie in Java: Überhaupt keine IEEE-Konformität</a:t>
             </a:r>
           </a:p>
           <a:p>
@@ -1594,16 +1556,11 @@
               <a:rPr lang="de-DE" baseline="0" dirty="0" smtClean="0"/>
               <a:t> sind praktisch, weil…</a:t>
             </a:r>
-            <a:endParaRPr lang="de-DE" baseline="0" dirty="0" smtClean="0"/>
           </a:p>
           <a:p>
             <a:r>
               <a:rPr lang="de-DE" baseline="0" dirty="0" smtClean="0"/>
-              <a:t>4.: </a:t>
-            </a:r>
-            <a:r>
-              <a:rPr lang="de-DE" baseline="0" dirty="0" smtClean="0"/>
-              <a:t>Berechnung einmal als </a:t>
+              <a:t>4.: Berechnung einmal als </a:t>
             </a:r>
             <a:r>
               <a:rPr lang="de-DE" baseline="0" dirty="0" err="1" smtClean="0"/>
@@ -1625,11 +1582,7 @@
           <a:p>
             <a:r>
               <a:rPr lang="de-DE" baseline="0" dirty="0" smtClean="0"/>
-              <a:t>dann </a:t>
-            </a:r>
-            <a:r>
-              <a:rPr lang="de-DE" baseline="0" dirty="0" smtClean="0"/>
-              <a:t>aber „</a:t>
+              <a:t>dann aber „</a:t>
             </a:r>
             <a:r>
               <a:rPr lang="de-DE" baseline="0" dirty="0" err="1" smtClean="0"/>
@@ -1637,11 +1590,7 @@
             </a:r>
             <a:r>
               <a:rPr lang="de-DE" baseline="0" dirty="0" smtClean="0"/>
-              <a:t>“ </a:t>
-            </a:r>
-            <a:r>
-              <a:rPr lang="de-DE" baseline="0" dirty="0" smtClean="0"/>
-              <a:t>Code</a:t>
+              <a:t>“ Code</a:t>
             </a:r>
           </a:p>
         </p:txBody>
@@ -1734,19 +1683,11 @@
           <a:p>
             <a:r>
               <a:rPr lang="de-DE" dirty="0" smtClean="0"/>
-              <a:t>4. </a:t>
-            </a:r>
-            <a:r>
-              <a:rPr lang="de-DE" dirty="0" smtClean="0"/>
-              <a:t>(Multiplikation</a:t>
+              <a:t>4. (Multiplikation</a:t>
             </a:r>
             <a:r>
               <a:rPr lang="de-DE" baseline="0" dirty="0" smtClean="0"/>
-              <a:t> wäre auch </a:t>
-            </a:r>
-            <a:r>
-              <a:rPr lang="de-DE" baseline="0" dirty="0" smtClean="0"/>
-              <a:t>möglich, falls Ergebnis im darstellbaren Zahlenbereich), DIVISION NICHT</a:t>
+              <a:t> wäre auch möglich, falls Ergebnis im darstellbaren Zahlenbereich), DIVISION NICHT</a:t>
             </a:r>
             <a:endParaRPr lang="de-DE" dirty="0" smtClean="0"/>
           </a:p>
@@ -1845,11 +1786,7 @@
           <a:p>
             <a:r>
               <a:rPr lang="de-DE" dirty="0" smtClean="0"/>
-              <a:t>2</a:t>
-            </a:r>
-            <a:r>
-              <a:rPr lang="de-DE" dirty="0" smtClean="0"/>
-              <a:t>.:</a:t>
+              <a:t>2.:</a:t>
             </a:r>
             <a:r>
               <a:rPr lang="de-DE" baseline="0" dirty="0" smtClean="0"/>
@@ -1861,27 +1798,55 @@
             </a:r>
             <a:r>
               <a:rPr lang="de-DE" baseline="0" dirty="0" smtClean="0"/>
-              <a:t> </a:t>
-            </a:r>
+              <a:t> schlägt Eigenschaften vor, die von den Algorithmen erhalten werden</a:t>
+            </a:r>
+          </a:p>
+          <a:p>
             <a:r>
               <a:rPr lang="de-DE" baseline="0" dirty="0" smtClean="0"/>
-              <a:t>schlägt </a:t>
+              <a:t>2.2. Entsteht schon aus der Forderung „streng abnehmender Betrag</a:t>
             </a:r>
             <a:r>
               <a:rPr lang="de-DE" baseline="0" dirty="0" smtClean="0"/>
-              <a:t>Eigenschaften vor, die von den Algorithmen erhalten </a:t>
-            </a:r>
+              <a:t>“</a:t>
+            </a:r>
+          </a:p>
+          <a:p>
             <a:r>
               <a:rPr lang="de-DE" baseline="0" dirty="0" smtClean="0"/>
-              <a:t>werden</a:t>
-            </a:r>
-          </a:p>
-          <a:p>
+              <a:t>3. z.B. Vergleich mit den </a:t>
+            </a:r>
+            <a:r>
+              <a:rPr lang="de-DE" baseline="0" dirty="0" err="1" smtClean="0"/>
+              <a:t>sw_floats</a:t>
+            </a:r>
             <a:r>
               <a:rPr lang="de-DE" baseline="0" dirty="0" smtClean="0"/>
-              <a:t>2.2. Entsteht schon aus der Forderung „streng abnehmender Betrag“</a:t>
-            </a:r>
-            <a:endParaRPr lang="de-DE" baseline="0" dirty="0" smtClean="0"/>
+              <a:t> aus </a:t>
+            </a:r>
+            <a:r>
+              <a:rPr lang="de-DE" baseline="0" dirty="0" err="1" smtClean="0"/>
+              <a:t>Float.float</a:t>
+            </a:r>
+            <a:r>
+              <a:rPr lang="de-DE" baseline="0" dirty="0" smtClean="0"/>
+              <a:t> an. Dieser Datentyp kann mehr Zahlen darstellen, benutzt aber die hardwareimplementierten </a:t>
+            </a:r>
+            <a:r>
+              <a:rPr lang="de-DE" baseline="0" dirty="0" err="1" smtClean="0"/>
+              <a:t>float</a:t>
+            </a:r>
+            <a:r>
+              <a:rPr lang="de-DE" baseline="0" dirty="0" smtClean="0"/>
+              <a:t>-Operationen nicht</a:t>
+            </a:r>
+          </a:p>
+          <a:p>
+            <a:r>
+              <a:rPr lang="de-DE" b="0" baseline="0" dirty="0" smtClean="0"/>
+              <a:t>	Ergebnis vermutlich abhängig von Architektur</a:t>
+            </a:r>
+            <a:endParaRPr lang="de-DE" b="0" baseline="0" dirty="0" smtClean="0"/>
           </a:p>
           <a:p>
             <a:r>
@@ -2001,7 +1966,21 @@
           <a:p>
             <a:r>
               <a:rPr lang="de-DE" baseline="0" dirty="0" smtClean="0"/>
-              <a:t>Und das Privileg, an diesem wichtigen Forschungsprojekt mitzuarbeiten</a:t>
+              <a:t>Und </a:t>
+            </a:r>
+            <a:r>
+              <a:rPr lang="de-DE" baseline="0" dirty="0" smtClean="0"/>
+              <a:t>das Privileg, an diesem wichtigen Forschungsprojekt </a:t>
+            </a:r>
+            <a:r>
+              <a:rPr lang="de-DE" baseline="0" dirty="0" smtClean="0"/>
+              <a:t>mitzuarbeiten</a:t>
+            </a:r>
+          </a:p>
+          <a:p>
+            <a:r>
+              <a:rPr lang="de-DE" baseline="0" dirty="0" smtClean="0"/>
+              <a:t>TODO: Bild</a:t>
             </a:r>
             <a:endParaRPr lang="de-DE" dirty="0"/>
           </a:p>
@@ -2089,22 +2068,19 @@
           <a:p>
             <a:r>
               <a:rPr lang="de-DE" dirty="0" smtClean="0"/>
-              <a:t>TODO: </a:t>
-            </a:r>
-            <a:r>
-              <a:rPr lang="de-DE" dirty="0" smtClean="0"/>
-              <a:t>LOGO</a:t>
-            </a:r>
-            <a:endParaRPr lang="de-DE" dirty="0" smtClean="0"/>
-          </a:p>
-          <a:p>
-            <a:r>
-              <a:rPr lang="de-DE" dirty="0" err="1" smtClean="0"/>
-              <a:t>Ausfühbarkeit</a:t>
-            </a:r>
-            <a:r>
-              <a:rPr lang="de-DE" dirty="0" smtClean="0"/>
-              <a:t> auf Grafikprozessoren</a:t>
+              <a:t>schnelle</a:t>
+            </a:r>
+            <a:r>
+              <a:rPr lang="de-DE" baseline="0" dirty="0" smtClean="0"/>
+              <a:t> </a:t>
+            </a:r>
+            <a:r>
+              <a:rPr lang="de-DE" dirty="0" smtClean="0"/>
+              <a:t>Ausführbarkeit</a:t>
+            </a:r>
+            <a:r>
+              <a:rPr lang="de-DE" baseline="0" dirty="0" smtClean="0"/>
+              <a:t> sicherstellen</a:t>
             </a:r>
             <a:endParaRPr lang="de-DE" dirty="0"/>
           </a:p>
@@ -2276,26 +2252,7 @@
           <a:p>
             <a:r>
               <a:rPr lang="de-DE" dirty="0" smtClean="0"/>
-              <a:t>Ziel</a:t>
-            </a:r>
-            <a:r>
-              <a:rPr lang="de-DE" baseline="0" dirty="0" smtClean="0"/>
-              <a:t> e</a:t>
-            </a:r>
-            <a:r>
-              <a:rPr lang="de-DE" dirty="0" smtClean="0"/>
-              <a:t>rwähnen:</a:t>
-            </a:r>
-            <a:r>
-              <a:rPr lang="de-DE" baseline="0" dirty="0" smtClean="0"/>
-              <a:t> Arithmetik über berechenbaren Zahlen</a:t>
-            </a:r>
-            <a:endParaRPr lang="de-DE" dirty="0" smtClean="0"/>
-          </a:p>
-          <a:p>
-            <a:r>
-              <a:rPr lang="de-DE" dirty="0" smtClean="0"/>
-              <a:t>TODO:</a:t>
+              <a:t>Ziel:</a:t>
             </a:r>
             <a:r>
               <a:rPr lang="de-DE" baseline="0" dirty="0" smtClean="0"/>
@@ -2303,22 +2260,36 @@
             </a:r>
             <a:r>
               <a:rPr lang="de-DE" baseline="0" dirty="0" smtClean="0"/>
-              <a:t>Grafik</a:t>
-            </a:r>
-            <a:endParaRPr lang="de-DE" baseline="0" dirty="0" smtClean="0"/>
-          </a:p>
-          <a:p>
-            <a:r>
-              <a:rPr lang="de-DE" dirty="0" smtClean="0"/>
-              <a:t>Ansatz 3 wird</a:t>
+              <a:t>Arithmetik über </a:t>
             </a:r>
             <a:r>
               <a:rPr lang="de-DE" baseline="0" dirty="0" smtClean="0"/>
-              <a:t> später </a:t>
+              <a:t>einer Teilmenge der berechenbaren Zahlen</a:t>
+            </a:r>
+          </a:p>
+          <a:p>
+            <a:r>
+              <a:rPr lang="de-DE" dirty="0" smtClean="0"/>
+              <a:t>Viele Formate erlauben</a:t>
             </a:r>
             <a:r>
               <a:rPr lang="de-DE" baseline="0" dirty="0" smtClean="0"/>
-              <a:t>erklärt, grob läuft das so</a:t>
+              <a:t> nur endlich viele Werte</a:t>
+            </a:r>
+            <a:endParaRPr lang="de-DE" dirty="0" smtClean="0"/>
+          </a:p>
+          <a:p>
+            <a:r>
+              <a:rPr lang="de-DE" dirty="0" smtClean="0"/>
+              <a:t>3 </a:t>
+            </a:r>
+            <a:r>
+              <a:rPr lang="de-DE" dirty="0" smtClean="0"/>
+              <a:t>wird</a:t>
+            </a:r>
+            <a:r>
+              <a:rPr lang="de-DE" baseline="0" dirty="0" smtClean="0"/>
+              <a:t> später erklärt, grob läuft das so</a:t>
             </a:r>
           </a:p>
           <a:p>
@@ -2623,11 +2594,7 @@
           <a:p>
             <a:r>
               <a:rPr lang="de-DE" dirty="0" smtClean="0"/>
-              <a:t>Unter </a:t>
-            </a:r>
-            <a:r>
-              <a:rPr lang="de-DE" dirty="0" smtClean="0"/>
-              <a:t>Verwendung</a:t>
+              <a:t>Unter Verwendung</a:t>
             </a:r>
             <a:r>
               <a:rPr lang="de-DE" baseline="0" dirty="0" smtClean="0"/>
@@ -2639,29 +2606,13 @@
             </a:r>
             <a:r>
               <a:rPr lang="de-DE" baseline="0" dirty="0" smtClean="0"/>
-              <a:t>“), es wird eine Art Übermenge. Es liegt also nahe, das erstmal für die Floats selbst zu machen. (1</a:t>
-            </a:r>
-            <a:r>
-              <a:rPr lang="de-DE" baseline="0" dirty="0" smtClean="0"/>
-              <a:t>) </a:t>
+              <a:t>“), es wird eine Art Übermenge. Es liegt also nahe, das erstmal für die Floats selbst zu machen. (1) </a:t>
             </a:r>
             <a:r>
               <a:rPr lang="de-DE" baseline="0" dirty="0" smtClean="0">
                 <a:sym typeface="Wingdings" panose="05000000000000000000" pitchFamily="2" charset="2"/>
               </a:rPr>
-              <a:t> einzige </a:t>
-            </a:r>
-            <a:r>
-              <a:rPr lang="de-DE" baseline="0" dirty="0" smtClean="0">
-                <a:sym typeface="Wingdings" panose="05000000000000000000" pitchFamily="2" charset="2"/>
-              </a:rPr>
-              <a:t>Möglichkeit (es ist möglich): </a:t>
-            </a:r>
-            <a:r>
-              <a:rPr lang="de-DE" baseline="0" dirty="0" smtClean="0">
-                <a:sym typeface="Wingdings" panose="05000000000000000000" pitchFamily="2" charset="2"/>
-              </a:rPr>
-              <a:t>Speicherung (2)</a:t>
+              <a:t> einzige Möglichkeit (es ist möglich): Speicherung (2)</a:t>
             </a:r>
           </a:p>
           <a:p>
@@ -2873,13 +2824,7 @@
               <a:rPr lang="de-DE" baseline="0" dirty="0" smtClean="0">
                 <a:sym typeface="Wingdings" panose="05000000000000000000" pitchFamily="2" charset="2"/>
               </a:rPr>
-              <a:t>Beweis </a:t>
-            </a:r>
-            <a:r>
-              <a:rPr lang="de-DE" baseline="0" dirty="0" smtClean="0">
-                <a:sym typeface="Wingdings" panose="05000000000000000000" pitchFamily="2" charset="2"/>
-              </a:rPr>
-              <a:t>der Korrektheit läuft über viele Fallunterscheidungen, Analyse der </a:t>
+              <a:t>Beweis der Korrektheit läuft über viele Fallunterscheidungen, Analyse der </a:t>
             </a:r>
             <a:r>
               <a:rPr lang="de-DE" baseline="0" dirty="0" err="1" smtClean="0">
@@ -2899,15 +2844,13 @@
               <a:rPr lang="de-DE" baseline="0" dirty="0" smtClean="0">
                 <a:sym typeface="Wingdings" panose="05000000000000000000" pitchFamily="2" charset="2"/>
               </a:rPr>
-              <a:t>3.: das erste + ist exakt, das im Kreis nicht</a:t>
-            </a:r>
-          </a:p>
-          <a:p>
+              <a:t>3.: das erste + ist exakt, das im Kreis </a:t>
+            </a:r>
             <a:r>
               <a:rPr lang="de-DE" baseline="0" dirty="0" smtClean="0">
                 <a:sym typeface="Wingdings" panose="05000000000000000000" pitchFamily="2" charset="2"/>
               </a:rPr>
-              <a:t>Wie gesagt: Dieser Teil war schon bekannt</a:t>
+              <a:t>nicht</a:t>
             </a:r>
           </a:p>
           <a:p>
@@ -2915,13 +2858,23 @@
               <a:rPr lang="de-DE" baseline="0" dirty="0" smtClean="0">
                 <a:sym typeface="Wingdings" panose="05000000000000000000" pitchFamily="2" charset="2"/>
               </a:rPr>
-              <a:t>TODO: Farben</a:t>
-            </a:r>
+              <a:t>Informell geschrieben, Typinformationen fehlen</a:t>
+            </a:r>
+          </a:p>
+          <a:p>
             <a:r>
               <a:rPr lang="de-DE" baseline="0" dirty="0" smtClean="0">
                 <a:sym typeface="Wingdings" panose="05000000000000000000" pitchFamily="2" charset="2"/>
               </a:rPr>
-              <a:t>?</a:t>
+              <a:t>(Tafel) 5,2 </a:t>
+            </a:r>
+            <a:r>
+              <a:rPr lang="de-DE" dirty="0" smtClean="0"/>
+              <a:t>⊕ 6,1</a:t>
+            </a:r>
+            <a:r>
+              <a:rPr lang="de-DE" baseline="0" dirty="0" smtClean="0"/>
+              <a:t> = 11   |</a:t>
             </a:r>
           </a:p>
           <a:p>
@@ -2929,9 +2882,28 @@
               <a:rPr lang="de-DE" baseline="0" dirty="0" smtClean="0">
                 <a:sym typeface="Wingdings" panose="05000000000000000000" pitchFamily="2" charset="2"/>
               </a:rPr>
-              <a:t>Beispiel erweitern</a:t>
-            </a:r>
-            <a:endParaRPr lang="de-DE" dirty="0"/>
+              <a:t>5,2 + 6,1 = 11,3 = 11    |   + 0,3, nicht 10 + 1,3 wg. 11 oben</a:t>
+            </a:r>
+            <a:endParaRPr lang="de-DE" baseline="0" dirty="0" smtClean="0">
+              <a:sym typeface="Wingdings" panose="05000000000000000000" pitchFamily="2" charset="2"/>
+            </a:endParaRPr>
+          </a:p>
+          <a:p>
+            <a:r>
+              <a:rPr lang="de-DE" baseline="0" dirty="0" smtClean="0">
+                <a:sym typeface="Wingdings" panose="05000000000000000000" pitchFamily="2" charset="2"/>
+              </a:rPr>
+              <a:t>Wie gesagt: Dieser Teil war schon </a:t>
+            </a:r>
+            <a:r>
+              <a:rPr lang="de-DE" baseline="0" dirty="0" smtClean="0">
+                <a:sym typeface="Wingdings" panose="05000000000000000000" pitchFamily="2" charset="2"/>
+              </a:rPr>
+              <a:t>bekannt</a:t>
+            </a:r>
+            <a:endParaRPr lang="de-DE" baseline="0" dirty="0" smtClean="0">
+              <a:sym typeface="Wingdings" panose="05000000000000000000" pitchFamily="2" charset="2"/>
+            </a:endParaRPr>
           </a:p>
         </p:txBody>
       </p:sp>
@@ -3034,11 +3006,7 @@
             </a:pPr>
             <a:r>
               <a:rPr lang="de-DE" baseline="0" dirty="0" smtClean="0"/>
-              <a:t>Wann </a:t>
-            </a:r>
-            <a:r>
-              <a:rPr lang="de-DE" baseline="0" dirty="0" smtClean="0"/>
-              <a:t>ist </a:t>
+              <a:t>Wann ist </a:t>
             </a:r>
             <a:r>
               <a:rPr lang="de-DE" baseline="0" dirty="0" err="1" smtClean="0"/>
@@ -3073,11 +3041,7 @@
             </a:r>
             <a:r>
               <a:rPr lang="de-DE" baseline="0" dirty="0" smtClean="0"/>
-              <a:t> welches Format man konvertiert ist dabei egal, es muss nur eine rundungsfreies + </a:t>
-            </a:r>
-            <a:r>
-              <a:rPr lang="de-DE" baseline="0" dirty="0" smtClean="0"/>
-              <a:t>bereitstellen</a:t>
+              <a:t> welches Format man konvertiert ist dabei egal, es muss nur eine rundungsfreies + bereitstellen</a:t>
             </a:r>
           </a:p>
           <a:p>
@@ -3186,11 +3150,7 @@
             </a:r>
             <a:r>
               <a:rPr lang="de-DE" baseline="0" dirty="0" smtClean="0"/>
-              <a:t> da sonst die Präzision nicht ausreicht, Der Wert dieser Liste ist dann die exakte Summe der </a:t>
-            </a:r>
-            <a:r>
-              <a:rPr lang="de-DE" baseline="0" dirty="0" smtClean="0"/>
-              <a:t>Komponenten</a:t>
+              <a:t> da sonst die Präzision nicht ausreicht, Der Wert dieser Liste ist dann die exakte Summe der Komponenten</a:t>
             </a:r>
           </a:p>
           <a:p>
@@ -3198,7 +3158,6 @@
               <a:rPr lang="de-DE" baseline="0" dirty="0" smtClean="0"/>
               <a:t>3.2.: Sonst: leere Liste zulässig (keine Approximation ohne Test mehr)</a:t>
             </a:r>
-            <a:endParaRPr lang="de-DE" baseline="0" dirty="0" smtClean="0"/>
           </a:p>
           <a:p>
             <a:r>
@@ -3230,11 +3189,7 @@
             </a:r>
             <a:r>
               <a:rPr lang="de-DE" baseline="0" dirty="0" smtClean="0"/>
-              <a:t> </a:t>
-            </a:r>
-            <a:r>
-              <a:rPr lang="de-DE" baseline="0" dirty="0" smtClean="0"/>
-              <a:t>dadurch Approximation nur mit </a:t>
+              <a:t> dadurch Approximation nur mit </a:t>
             </a:r>
             <a:r>
               <a:rPr lang="de-DE" baseline="0" dirty="0" err="1" smtClean="0"/>
@@ -3256,11 +3211,7 @@
             </a:r>
             <a:r>
               <a:rPr lang="de-DE" baseline="0" dirty="0" smtClean="0"/>
-              <a:t>, rechts: </a:t>
-            </a:r>
-            <a:r>
-              <a:rPr lang="de-DE" baseline="0" dirty="0" smtClean="0"/>
-              <a:t>Fehlerwerte</a:t>
+              <a:t>, rechts: Fehlerwerte</a:t>
             </a:r>
           </a:p>
           <a:p>
@@ -6290,15 +6241,7 @@
           <a:p>
             <a:r>
               <a:rPr lang="de-DE" dirty="0" smtClean="0"/>
-              <a:t>Schritt </a:t>
-            </a:r>
-            <a:r>
-              <a:rPr lang="de-DE" dirty="0" smtClean="0"/>
-              <a:t>3: </a:t>
-            </a:r>
-            <a:r>
-              <a:rPr lang="de-DE" dirty="0" smtClean="0"/>
-              <a:t>Algorithmen zum Weiterrechnen</a:t>
+              <a:t>Schritt 3: Algorithmen zum Weiterrechnen</a:t>
             </a:r>
             <a:endParaRPr lang="de-DE" dirty="0"/>
           </a:p>
@@ -6666,11 +6609,7 @@
           <a:p>
             <a:r>
               <a:rPr lang="de-DE" dirty="0" smtClean="0"/>
-              <a:t>Schritt </a:t>
-            </a:r>
-            <a:r>
-              <a:rPr lang="de-DE" dirty="0" smtClean="0"/>
-              <a:t>3: </a:t>
+              <a:t>Schritt 3: </a:t>
             </a:r>
             <a:r>
               <a:rPr lang="de-DE" dirty="0" err="1" smtClean="0"/>
@@ -7359,11 +7298,7 @@
             </a:r>
             <a:r>
               <a:rPr lang="de-DE" dirty="0" smtClean="0"/>
-              <a:t> nicht </a:t>
-            </a:r>
-            <a:r>
-              <a:rPr lang="de-DE" dirty="0" smtClean="0"/>
-              <a:t>gegeben</a:t>
+              <a:t> nicht gegeben</a:t>
             </a:r>
           </a:p>
           <a:p>
@@ -8051,11 +7986,7 @@
             </a:r>
             <a:r>
               <a:rPr lang="de-DE" dirty="0" smtClean="0"/>
-              <a:t> </a:t>
-            </a:r>
-            <a:r>
-              <a:rPr lang="de-DE" dirty="0" smtClean="0"/>
-              <a:t>fehlerhaft</a:t>
+              <a:t> fehlerhaft</a:t>
             </a:r>
           </a:p>
           <a:p>
@@ -8070,7 +8001,6 @@
               <a:rPr lang="de-DE" dirty="0" smtClean="0"/>
               <a:t>Genauigkeit der Berechnung nicht vorhersehbar</a:t>
             </a:r>
-            <a:endParaRPr lang="de-DE" dirty="0" smtClean="0"/>
           </a:p>
           <a:p>
             <a:r>
@@ -8115,11 +8045,7 @@
             </a:r>
             <a:r>
               <a:rPr lang="de-DE" sz="3600" i="1" dirty="0" err="1" smtClean="0"/>
-              <a:t>sw_</a:t>
-            </a:r>
-            <a:r>
-              <a:rPr lang="de-DE" sz="3600" i="1" dirty="0" err="1" smtClean="0"/>
-              <a:t>float</a:t>
+              <a:t>sw_float</a:t>
             </a:r>
             <a:r>
               <a:rPr lang="de-DE" sz="3600" i="1" dirty="0" smtClean="0"/>
@@ -8137,7 +8063,6 @@
               <a:rPr lang="de-DE" sz="3600" dirty="0" smtClean="0"/>
               <a:t>) als Referenzimplementierung</a:t>
             </a:r>
-            <a:endParaRPr lang="de-DE" sz="3600" dirty="0" smtClean="0"/>
           </a:p>
         </p:txBody>
       </p:sp>
@@ -8225,11 +8150,7 @@
           <a:p>
             <a:r>
               <a:rPr lang="de-DE" dirty="0" smtClean="0"/>
-              <a:t>Umsetzung</a:t>
-            </a:r>
-            <a:r>
-              <a:rPr lang="de-DE" dirty="0" smtClean="0"/>
-              <a:t>: </a:t>
+              <a:t>Umsetzung: </a:t>
             </a:r>
             <a:r>
               <a:rPr lang="de-DE" dirty="0" err="1" smtClean="0"/>
@@ -8269,11 +8190,7 @@
             </a:r>
             <a:r>
               <a:rPr lang="de-DE" dirty="0" smtClean="0"/>
-              <a:t> </a:t>
-            </a:r>
-            <a:r>
-              <a:rPr lang="de-DE" dirty="0" smtClean="0"/>
-              <a:t>IEEE-Berechnungen</a:t>
+              <a:t> IEEE-Berechnungen</a:t>
             </a:r>
             <a:endParaRPr lang="de-DE" dirty="0"/>
           </a:p>
@@ -8382,11 +8299,7 @@
             </a:r>
             <a:r>
               <a:rPr lang="de-DE" sz="3200" dirty="0" smtClean="0"/>
-              <a:t> in </a:t>
-            </a:r>
-            <a:r>
-              <a:rPr lang="de-DE" sz="3200" dirty="0" smtClean="0"/>
-              <a:t>Isabelle</a:t>
+              <a:t> in Isabelle</a:t>
             </a:r>
           </a:p>
           <a:p>
@@ -8443,8 +8356,19 @@
             <a:pPr lvl="1"/>
             <a:r>
               <a:rPr lang="de-DE" sz="2800" dirty="0" smtClean="0"/>
-              <a:t>Maximale Länge der Fehlerliste</a:t>
-            </a:r>
+              <a:t>Maximale Länge der </a:t>
+            </a:r>
+            <a:r>
+              <a:rPr lang="de-DE" sz="2800" dirty="0" smtClean="0"/>
+              <a:t>Fehlerliste</a:t>
+            </a:r>
+          </a:p>
+          <a:p>
+            <a:r>
+              <a:rPr lang="de-DE" sz="3200" dirty="0" smtClean="0"/>
+              <a:t>Laufzeituntersuchungen</a:t>
+            </a:r>
+            <a:endParaRPr lang="de-DE" sz="3200" dirty="0" smtClean="0"/>
           </a:p>
           <a:p>
             <a:r>
@@ -8680,7 +8604,7 @@
         </p:nvSpPr>
         <p:spPr>
           <a:xfrm>
-            <a:off x="3176336" y="4008577"/>
+            <a:off x="3176334" y="5674091"/>
             <a:ext cx="5839327" cy="707886"/>
           </a:xfrm>
           <a:prstGeom prst="rect">
@@ -8697,12 +8621,53 @@
             <a:pPr algn="ctr"/>
             <a:r>
               <a:rPr lang="de-DE" sz="4000" dirty="0" smtClean="0"/>
-              <a:t>Verifikation</a:t>
+              <a:t>Verifikation!</a:t>
             </a:r>
             <a:endParaRPr lang="de-DE" sz="4000" dirty="0"/>
           </a:p>
         </p:txBody>
       </p:sp>
+      <p:pic>
+        <p:nvPicPr>
+          <p:cNvPr id="1026" name="Picture 2" descr="Isabelle home"/>
+          <p:cNvPicPr>
+            <a:picLocks noChangeAspect="1" noChangeArrowheads="1"/>
+          </p:cNvPicPr>
+          <p:nvPr/>
+        </p:nvPicPr>
+        <p:blipFill>
+          <a:blip r:embed="rId3">
+            <a:extLst>
+              <a:ext uri="{28A0092B-C50C-407E-A947-70E740481C1C}">
+                <a14:useLocalDpi xmlns:a14="http://schemas.microsoft.com/office/drawing/2010/main" val="0"/>
+              </a:ext>
+            </a:extLst>
+          </a:blip>
+          <a:srcRect/>
+          <a:stretch>
+            <a:fillRect/>
+          </a:stretch>
+        </p:blipFill>
+        <p:spPr bwMode="auto">
+          <a:xfrm>
+            <a:off x="5125371" y="3865036"/>
+            <a:ext cx="1941251" cy="1702852"/>
+          </a:xfrm>
+          <a:prstGeom prst="rect">
+            <a:avLst/>
+          </a:prstGeom>
+          <a:noFill/>
+          <a:extLst>
+            <a:ext uri="{909E8E84-426E-40DD-AFC4-6F175D3DCCD1}">
+              <a14:hiddenFill xmlns:a14="http://schemas.microsoft.com/office/drawing/2010/main">
+                <a:solidFill>
+                  <a:srgbClr val="FFFFFF"/>
+                </a:solidFill>
+              </a14:hiddenFill>
+            </a:ext>
+          </a:extLst>
+        </p:spPr>
+      </p:pic>
     </p:spTree>
     <p:extLst>
       <p:ext uri="{BB962C8B-B14F-4D97-AF65-F5344CB8AC3E}">
@@ -9024,25 +8989,28 @@
           </a:p>
           <a:p>
             <a:pPr marL="514350" indent="-514350">
-              <a:buAutoNum type="alphaLcParenR"/>
+              <a:buFont typeface="+mj-lt"/>
+              <a:buAutoNum type="alphaLcPeriod"/>
             </a:pPr>
             <a:r>
               <a:rPr lang="de-DE" dirty="0" smtClean="0"/>
-              <a:t>Analysieren/Entscheiden</a:t>
-            </a:r>
+              <a:t>Numerisch Analysieren/Entscheiden</a:t>
+            </a:r>
+            <a:endParaRPr lang="de-DE" dirty="0" smtClean="0"/>
           </a:p>
           <a:p>
             <a:pPr marL="514350" indent="-514350">
-              <a:buAutoNum type="alphaLcParenR"/>
+              <a:buAutoNum type="alphaLcPeriod"/>
             </a:pPr>
             <a:r>
               <a:rPr lang="de-DE" dirty="0" smtClean="0"/>
               <a:t>Vermeiden</a:t>
             </a:r>
+            <a:endParaRPr lang="de-DE" dirty="0" smtClean="0"/>
           </a:p>
           <a:p>
             <a:pPr marL="514350" indent="-514350">
-              <a:buAutoNum type="alphaLcParenR"/>
+              <a:buAutoNum type="alphaLcPeriod"/>
             </a:pPr>
             <a:r>
               <a:rPr lang="de-DE" dirty="0" smtClean="0">
@@ -9066,7 +9034,7 @@
                   <a:srgbClr val="00B050"/>
                 </a:solidFill>
               </a:rPr>
-              <a:t>“</a:t>
+              <a:t> “</a:t>
             </a:r>
             <a:endParaRPr lang="de-DE" dirty="0">
               <a:solidFill>
@@ -9076,7 +9044,7 @@
           </a:p>
           <a:p>
             <a:pPr marL="514350" indent="-514350">
-              <a:buAutoNum type="alphaLcParenR"/>
+              <a:buAutoNum type="alphaLcPeriod"/>
             </a:pPr>
             <a:endParaRPr lang="de-DE" dirty="0">
               <a:solidFill>
@@ -9086,6 +9054,341 @@
           </a:p>
         </p:txBody>
       </p:sp>
+      <p:grpSp>
+        <p:nvGrpSpPr>
+          <p:cNvPr id="24" name="Gruppieren 23"/>
+          <p:cNvGrpSpPr/>
+          <p:nvPr/>
+        </p:nvGrpSpPr>
+        <p:grpSpPr>
+          <a:xfrm>
+            <a:off x="2173284" y="3823232"/>
+            <a:ext cx="5860374" cy="2883173"/>
+            <a:chOff x="2173284" y="3823232"/>
+            <a:chExt cx="5860374" cy="2883173"/>
+          </a:xfrm>
+        </p:grpSpPr>
+        <p:grpSp>
+          <p:nvGrpSpPr>
+            <p:cNvPr id="22" name="Gruppieren 21"/>
+            <p:cNvGrpSpPr/>
+            <p:nvPr/>
+          </p:nvGrpSpPr>
+          <p:grpSpPr>
+            <a:xfrm>
+              <a:off x="2173284" y="4034745"/>
+              <a:ext cx="5860374" cy="2671660"/>
+              <a:chOff x="850669" y="4016829"/>
+              <a:chExt cx="5435832" cy="2720645"/>
+            </a:xfrm>
+          </p:grpSpPr>
+          <p:cxnSp>
+            <p:nvCxnSpPr>
+              <p:cNvPr id="9" name="Gerade Verbindung mit Pfeil 8"/>
+              <p:cNvCxnSpPr/>
+              <p:nvPr/>
+            </p:nvCxnSpPr>
+            <p:spPr>
+              <a:xfrm flipV="1">
+                <a:off x="1812471" y="4016829"/>
+                <a:ext cx="0" cy="2530928"/>
+              </a:xfrm>
+              <a:prstGeom prst="straightConnector1">
+                <a:avLst/>
+              </a:prstGeom>
+              <a:ln>
+                <a:solidFill>
+                  <a:schemeClr val="tx1"/>
+                </a:solidFill>
+                <a:tailEnd type="triangle"/>
+              </a:ln>
+            </p:spPr>
+            <p:style>
+              <a:lnRef idx="1">
+                <a:schemeClr val="accent1"/>
+              </a:lnRef>
+              <a:fillRef idx="0">
+                <a:schemeClr val="accent1"/>
+              </a:fillRef>
+              <a:effectRef idx="0">
+                <a:schemeClr val="accent1"/>
+              </a:effectRef>
+              <a:fontRef idx="minor">
+                <a:schemeClr val="tx1"/>
+              </a:fontRef>
+            </p:style>
+          </p:cxnSp>
+          <p:cxnSp>
+            <p:nvCxnSpPr>
+              <p:cNvPr id="11" name="Gerade Verbindung mit Pfeil 10"/>
+              <p:cNvCxnSpPr/>
+              <p:nvPr/>
+            </p:nvCxnSpPr>
+            <p:spPr>
+              <a:xfrm>
+                <a:off x="1616529" y="6368142"/>
+                <a:ext cx="4669972" cy="0"/>
+              </a:xfrm>
+              <a:prstGeom prst="straightConnector1">
+                <a:avLst/>
+              </a:prstGeom>
+              <a:ln>
+                <a:solidFill>
+                  <a:schemeClr val="tx1"/>
+                </a:solidFill>
+                <a:tailEnd type="triangle"/>
+              </a:ln>
+            </p:spPr>
+            <p:style>
+              <a:lnRef idx="1">
+                <a:schemeClr val="accent1"/>
+              </a:lnRef>
+              <a:fillRef idx="0">
+                <a:schemeClr val="accent1"/>
+              </a:fillRef>
+              <a:effectRef idx="0">
+                <a:schemeClr val="accent1"/>
+              </a:effectRef>
+              <a:fontRef idx="minor">
+                <a:schemeClr val="tx1"/>
+              </a:fontRef>
+            </p:style>
+          </p:cxnSp>
+          <p:sp>
+            <p:nvSpPr>
+              <p:cNvPr id="15" name="Rechteck 14"/>
+              <p:cNvSpPr/>
+              <p:nvPr/>
+            </p:nvSpPr>
+            <p:spPr>
+              <a:xfrm>
+                <a:off x="2192792" y="4191391"/>
+                <a:ext cx="356188" cy="523220"/>
+              </a:xfrm>
+              <a:prstGeom prst="rect">
+                <a:avLst/>
+              </a:prstGeom>
+            </p:spPr>
+            <p:txBody>
+              <a:bodyPr wrap="none">
+                <a:spAutoFit/>
+              </a:bodyPr>
+              <a:lstStyle/>
+              <a:p>
+                <a:r>
+                  <a:rPr lang="de-DE" sz="2800" dirty="0"/>
+                  <a:t>a</a:t>
+                </a:r>
+              </a:p>
+            </p:txBody>
+          </p:sp>
+          <p:sp>
+            <p:nvSpPr>
+              <p:cNvPr id="16" name="Rechteck 15"/>
+              <p:cNvSpPr/>
+              <p:nvPr/>
+            </p:nvSpPr>
+            <p:spPr>
+              <a:xfrm>
+                <a:off x="5722180" y="5653743"/>
+                <a:ext cx="373820" cy="523220"/>
+              </a:xfrm>
+              <a:prstGeom prst="rect">
+                <a:avLst/>
+              </a:prstGeom>
+            </p:spPr>
+            <p:txBody>
+              <a:bodyPr wrap="none">
+                <a:spAutoFit/>
+              </a:bodyPr>
+              <a:lstStyle/>
+              <a:p>
+                <a:r>
+                  <a:rPr lang="de-DE" sz="2800" dirty="0"/>
+                  <a:t>b</a:t>
+                </a:r>
+              </a:p>
+            </p:txBody>
+          </p:sp>
+          <p:sp>
+            <p:nvSpPr>
+              <p:cNvPr id="17" name="Rechteck 16"/>
+              <p:cNvSpPr/>
+              <p:nvPr/>
+            </p:nvSpPr>
+            <p:spPr>
+              <a:xfrm>
+                <a:off x="3885615" y="5015913"/>
+                <a:ext cx="312542" cy="532813"/>
+              </a:xfrm>
+              <a:prstGeom prst="rect">
+                <a:avLst/>
+              </a:prstGeom>
+            </p:spPr>
+            <p:txBody>
+              <a:bodyPr wrap="none">
+                <a:spAutoFit/>
+              </a:bodyPr>
+              <a:lstStyle/>
+              <a:p>
+                <a:r>
+                  <a:rPr lang="de-DE" sz="2800" dirty="0" smtClean="0">
+                    <a:solidFill>
+                      <a:srgbClr val="00B050"/>
+                    </a:solidFill>
+                  </a:rPr>
+                  <a:t>c</a:t>
+                </a:r>
+                <a:endParaRPr lang="de-DE" sz="2800" dirty="0"/>
+              </a:p>
+            </p:txBody>
+          </p:sp>
+          <p:sp>
+            <p:nvSpPr>
+              <p:cNvPr id="18" name="Ellipse 17"/>
+              <p:cNvSpPr/>
+              <p:nvPr/>
+            </p:nvSpPr>
+            <p:spPr>
+              <a:xfrm rot="2996905">
+                <a:off x="3405675" y="4062361"/>
+                <a:ext cx="1272422" cy="2476507"/>
+              </a:xfrm>
+              <a:prstGeom prst="ellipse">
+                <a:avLst/>
+              </a:prstGeom>
+              <a:noFill/>
+              <a:ln w="28575">
+                <a:solidFill>
+                  <a:srgbClr val="00B050"/>
+                </a:solidFill>
+                <a:prstDash val="dash"/>
+              </a:ln>
+            </p:spPr>
+            <p:style>
+              <a:lnRef idx="2">
+                <a:schemeClr val="accent1">
+                  <a:shade val="50000"/>
+                </a:schemeClr>
+              </a:lnRef>
+              <a:fillRef idx="1">
+                <a:schemeClr val="accent1"/>
+              </a:fillRef>
+              <a:effectRef idx="0">
+                <a:schemeClr val="accent1"/>
+              </a:effectRef>
+              <a:fontRef idx="minor">
+                <a:schemeClr val="lt1"/>
+              </a:fontRef>
+            </p:style>
+            <p:txBody>
+              <a:bodyPr rtlCol="0" anchor="ctr"/>
+              <a:lstStyle/>
+              <a:p>
+                <a:pPr algn="ctr"/>
+                <a:endParaRPr lang="de-DE"/>
+              </a:p>
+            </p:txBody>
+          </p:sp>
+          <p:sp>
+            <p:nvSpPr>
+              <p:cNvPr id="20" name="Textfeld 19"/>
+              <p:cNvSpPr txBox="1"/>
+              <p:nvPr/>
+            </p:nvSpPr>
+            <p:spPr>
+              <a:xfrm>
+                <a:off x="850669" y="4191391"/>
+                <a:ext cx="961802" cy="369332"/>
+              </a:xfrm>
+              <a:prstGeom prst="rect">
+                <a:avLst/>
+              </a:prstGeom>
+              <a:noFill/>
+            </p:spPr>
+            <p:txBody>
+              <a:bodyPr wrap="none" rtlCol="0">
+                <a:spAutoFit/>
+              </a:bodyPr>
+              <a:lstStyle/>
+              <a:p>
+                <a:r>
+                  <a:rPr lang="de-DE" dirty="0" err="1" smtClean="0"/>
+                  <a:t>Geschw</a:t>
+                </a:r>
+                <a:r>
+                  <a:rPr lang="de-DE" dirty="0" smtClean="0"/>
+                  <a:t>.</a:t>
+                </a:r>
+                <a:endParaRPr lang="de-DE" dirty="0"/>
+              </a:p>
+            </p:txBody>
+          </p:sp>
+          <p:sp>
+            <p:nvSpPr>
+              <p:cNvPr id="21" name="Textfeld 20"/>
+              <p:cNvSpPr txBox="1"/>
+              <p:nvPr/>
+            </p:nvSpPr>
+            <p:spPr>
+              <a:xfrm>
+                <a:off x="5212232" y="6368142"/>
+                <a:ext cx="1019895" cy="369332"/>
+              </a:xfrm>
+              <a:prstGeom prst="rect">
+                <a:avLst/>
+              </a:prstGeom>
+              <a:noFill/>
+            </p:spPr>
+            <p:txBody>
+              <a:bodyPr wrap="none" rtlCol="0">
+                <a:spAutoFit/>
+              </a:bodyPr>
+              <a:lstStyle/>
+              <a:p>
+                <a:r>
+                  <a:rPr lang="de-DE" dirty="0" smtClean="0"/>
+                  <a:t>Präzision</a:t>
+                </a:r>
+                <a:endParaRPr lang="de-DE" dirty="0"/>
+              </a:p>
+            </p:txBody>
+          </p:sp>
+        </p:grpSp>
+        <p:sp>
+          <p:nvSpPr>
+            <p:cNvPr id="23" name="Rechteck 22"/>
+            <p:cNvSpPr/>
+            <p:nvPr/>
+          </p:nvSpPr>
+          <p:spPr>
+            <a:xfrm>
+              <a:off x="6386167" y="3823232"/>
+              <a:ext cx="351378" cy="523220"/>
+            </a:xfrm>
+            <a:prstGeom prst="rect">
+              <a:avLst/>
+            </a:prstGeom>
+          </p:spPr>
+          <p:txBody>
+            <a:bodyPr wrap="none">
+              <a:spAutoFit/>
+            </a:bodyPr>
+            <a:lstStyle/>
+            <a:p>
+              <a:r>
+                <a:rPr lang="de-DE" sz="2800" dirty="0">
+                  <a:solidFill>
+                    <a:srgbClr val="00B050"/>
+                  </a:solidFill>
+                </a:rPr>
+                <a:t>?</a:t>
+              </a:r>
+              <a:endParaRPr lang="de-DE" sz="2800" dirty="0"/>
+            </a:p>
+          </p:txBody>
+        </p:sp>
+      </p:grpSp>
     </p:spTree>
     <p:extLst>
       <p:ext uri="{BB962C8B-B14F-4D97-AF65-F5344CB8AC3E}">
@@ -9251,6 +9554,51 @@
                       </p:childTnLst>
                     </p:cTn>
                   </p:par>
+                  <p:par>
+                    <p:cTn id="15" fill="hold">
+                      <p:stCondLst>
+                        <p:cond delay="indefinite"/>
+                      </p:stCondLst>
+                      <p:childTnLst>
+                        <p:par>
+                          <p:cTn id="16" fill="hold">
+                            <p:stCondLst>
+                              <p:cond delay="0"/>
+                            </p:stCondLst>
+                            <p:childTnLst>
+                              <p:par>
+                                <p:cTn id="17" presetID="1" presetClass="entr" presetSubtype="0" fill="hold" nodeType="clickEffect">
+                                  <p:stCondLst>
+                                    <p:cond delay="0"/>
+                                  </p:stCondLst>
+                                  <p:childTnLst>
+                                    <p:set>
+                                      <p:cBhvr>
+                                        <p:cTn id="18" dur="1" fill="hold">
+                                          <p:stCondLst>
+                                            <p:cond delay="0"/>
+                                          </p:stCondLst>
+                                        </p:cTn>
+                                        <p:tgtEl>
+                                          <p:spTgt spid="24"/>
+                                        </p:tgtEl>
+                                        <p:attrNameLst>
+                                          <p:attrName>style.visibility</p:attrName>
+                                        </p:attrNameLst>
+                                      </p:cBhvr>
+                                      <p:to>
+                                        <p:strVal val="visible"/>
+                                      </p:to>
+                                    </p:set>
+                                  </p:childTnLst>
+                                </p:cTn>
+                              </p:par>
+                            </p:childTnLst>
+                          </p:cTn>
+                        </p:par>
+                      </p:childTnLst>
+                    </p:cTn>
+                  </p:par>
                 </p:childTnLst>
               </p:cTn>
               <p:prevCondLst>
@@ -9376,15 +9724,7 @@
                   <a:srgbClr val="00B050"/>
                 </a:solidFill>
               </a:rPr>
-              <a:t>„Floating Point Expansion</a:t>
-            </a:r>
-            <a:r>
-              <a:rPr lang="de-DE" dirty="0" smtClean="0">
-                <a:solidFill>
-                  <a:srgbClr val="00B050"/>
-                </a:solidFill>
-              </a:rPr>
-              <a:t>“</a:t>
+              <a:t>„Floating Point Expansion“</a:t>
             </a:r>
           </a:p>
           <a:p>
@@ -10243,19 +10583,7 @@
             </a:pPr>
             <a:r>
               <a:rPr lang="de-DE" dirty="0" smtClean="0"/>
-              <a:t>	⟶ </a:t>
-            </a:r>
-            <a:r>
-              <a:rPr lang="de-DE" dirty="0" smtClean="0"/>
-              <a:t>Berechnung</a:t>
-            </a:r>
-            <a:r>
-              <a:rPr lang="de-DE" dirty="0" smtClean="0"/>
-              <a:t> </a:t>
-            </a:r>
-            <a:r>
-              <a:rPr lang="de-DE" dirty="0" smtClean="0"/>
-              <a:t>des Rundungsfehlers</a:t>
+              <a:t>	⟶ Berechnung des Rundungsfehlers</a:t>
             </a:r>
           </a:p>
           <a:p>
@@ -10685,7 +11013,131 @@
             </a:r>
             <a:r>
               <a:rPr lang="de-DE" dirty="0" smtClean="0"/>
-              <a:t>⟶ Berechnung von y, sodass a + b = x + y und x = a ⊕ b</a:t>
+              <a:t>⟶ Berechnung von </a:t>
+            </a:r>
+            <a:r>
+              <a:rPr lang="de-DE" b="1" dirty="0" smtClean="0">
+                <a:solidFill>
+                  <a:srgbClr val="0070C0"/>
+                </a:solidFill>
+              </a:rPr>
+              <a:t>y</a:t>
+            </a:r>
+            <a:r>
+              <a:rPr lang="de-DE" dirty="0" smtClean="0"/>
+              <a:t>, sodass </a:t>
+            </a:r>
+            <a:r>
+              <a:rPr lang="de-DE" b="1" dirty="0" smtClean="0">
+                <a:solidFill>
+                  <a:srgbClr val="0070C0"/>
+                </a:solidFill>
+              </a:rPr>
+              <a:t>a</a:t>
+            </a:r>
+            <a:r>
+              <a:rPr lang="de-DE" dirty="0" smtClean="0"/>
+              <a:t> + </a:t>
+            </a:r>
+            <a:r>
+              <a:rPr lang="de-DE" b="1" dirty="0" smtClean="0">
+                <a:solidFill>
+                  <a:srgbClr val="0070C0"/>
+                </a:solidFill>
+              </a:rPr>
+              <a:t>b</a:t>
+            </a:r>
+            <a:r>
+              <a:rPr lang="de-DE" dirty="0" smtClean="0"/>
+              <a:t> = </a:t>
+            </a:r>
+            <a:r>
+              <a:rPr lang="de-DE" b="1" dirty="0" smtClean="0">
+                <a:solidFill>
+                  <a:srgbClr val="0070C0"/>
+                </a:solidFill>
+              </a:rPr>
+              <a:t>x</a:t>
+            </a:r>
+            <a:r>
+              <a:rPr lang="de-DE" dirty="0" smtClean="0">
+                <a:solidFill>
+                  <a:srgbClr val="0070C0"/>
+                </a:solidFill>
+              </a:rPr>
+              <a:t> </a:t>
+            </a:r>
+            <a:r>
+              <a:rPr lang="de-DE" dirty="0" smtClean="0"/>
+              <a:t>+ </a:t>
+            </a:r>
+            <a:r>
+              <a:rPr lang="de-DE" b="1" dirty="0" smtClean="0">
+                <a:solidFill>
+                  <a:srgbClr val="0070C0"/>
+                </a:solidFill>
+              </a:rPr>
+              <a:t>y</a:t>
+            </a:r>
+            <a:r>
+              <a:rPr lang="de-DE" dirty="0" smtClean="0">
+                <a:solidFill>
+                  <a:srgbClr val="0070C0"/>
+                </a:solidFill>
+              </a:rPr>
+              <a:t> </a:t>
+            </a:r>
+            <a:r>
+              <a:rPr lang="de-DE" dirty="0" smtClean="0"/>
+              <a:t>und </a:t>
+            </a:r>
+            <a:r>
+              <a:rPr lang="de-DE" b="1" dirty="0" smtClean="0">
+                <a:solidFill>
+                  <a:srgbClr val="0070C0"/>
+                </a:solidFill>
+              </a:rPr>
+              <a:t>x</a:t>
+            </a:r>
+            <a:r>
+              <a:rPr lang="de-DE" dirty="0" smtClean="0">
+                <a:solidFill>
+                  <a:srgbClr val="0070C0"/>
+                </a:solidFill>
+              </a:rPr>
+              <a:t> </a:t>
+            </a:r>
+            <a:r>
+              <a:rPr lang="de-DE" dirty="0" smtClean="0"/>
+              <a:t>= </a:t>
+            </a:r>
+            <a:r>
+              <a:rPr lang="de-DE" b="1" dirty="0" smtClean="0">
+                <a:solidFill>
+                  <a:srgbClr val="0070C0"/>
+                </a:solidFill>
+              </a:rPr>
+              <a:t>a</a:t>
+            </a:r>
+            <a:r>
+              <a:rPr lang="de-DE" dirty="0" smtClean="0">
+                <a:solidFill>
+                  <a:srgbClr val="0070C0"/>
+                </a:solidFill>
+              </a:rPr>
+              <a:t> </a:t>
+            </a:r>
+            <a:r>
+              <a:rPr lang="de-DE" dirty="0" smtClean="0"/>
+              <a:t>⊕ </a:t>
+            </a:r>
+            <a:r>
+              <a:rPr lang="de-DE" b="1" dirty="0" smtClean="0">
+                <a:solidFill>
+                  <a:srgbClr val="0070C0"/>
+                </a:solidFill>
+              </a:rPr>
+              <a:t>b</a:t>
             </a:r>
           </a:p>
           <a:p>
@@ -11279,15 +11731,7 @@
           <a:p>
             <a:r>
               <a:rPr lang="de-DE" dirty="0" smtClean="0"/>
-              <a:t>Darstellung des exakten Werts </a:t>
-            </a:r>
-            <a:r>
-              <a:rPr lang="de-DE" dirty="0" smtClean="0"/>
-              <a:t>als Summe von</a:t>
-            </a:r>
-            <a:r>
-              <a:rPr lang="de-DE" dirty="0" smtClean="0"/>
-              <a:t> </a:t>
+              <a:t>Darstellung des exakten Werts als Summe von </a:t>
             </a:r>
             <a:r>
               <a:rPr lang="de-DE" i="1" dirty="0" err="1" smtClean="0"/>
@@ -11328,19 +11772,7 @@
           <a:p>
             <a:r>
               <a:rPr lang="de-DE" dirty="0" smtClean="0"/>
-              <a:t>Verschiedene </a:t>
-            </a:r>
-            <a:r>
-              <a:rPr lang="de-DE" dirty="0" smtClean="0"/>
-              <a:t>Ein</a:t>
-            </a:r>
-            <a:r>
-              <a:rPr lang="de-DE" dirty="0" smtClean="0"/>
-              <a:t>schränkungen </a:t>
-            </a:r>
-            <a:r>
-              <a:rPr lang="de-DE" dirty="0" smtClean="0"/>
-              <a:t>nötig</a:t>
+              <a:t>Verschiedene Einschränkungen nötig</a:t>
             </a:r>
           </a:p>
           <a:p>
@@ -11362,11 +11794,7 @@
             <a:pPr lvl="1"/>
             <a:r>
               <a:rPr lang="de-DE" dirty="0" smtClean="0"/>
-              <a:t>nicht-leere </a:t>
-            </a:r>
-            <a:r>
-              <a:rPr lang="de-DE" dirty="0" smtClean="0"/>
-              <a:t>Liste</a:t>
+              <a:t>nicht-leere Liste</a:t>
             </a:r>
           </a:p>
           <a:p>

</xml_diff>